<commit_message>
J#41367: Made shareable profiles a peer, rather than a parent of the other capability profiles
</commit_message>
<xml_diff>
--- a/docs/CMIDiagrams.pptx
+++ b/docs/CMIDiagrams.pptx
@@ -18,7 +18,7 @@
     <p:sldId id="331" r:id="rId9"/>
     <p:sldId id="355" r:id="rId10"/>
     <p:sldId id="351" r:id="rId11"/>
-    <p:sldId id="4810" r:id="rId12"/>
+    <p:sldId id="4854" r:id="rId12"/>
     <p:sldId id="4809" r:id="rId13"/>
     <p:sldId id="4811" r:id="rId14"/>
     <p:sldId id="4812" r:id="rId15"/>
@@ -301,7 +301,7 @@
       <p15:sldGuideLst xmlns:p15="http://schemas.microsoft.com/office/powerpoint/2012/main"/>
     </p:ext>
     <p:ext uri="http://customooxmlschemas.google.com/">
-      <go:slidesCustomData xmlns="" xmlns:mc="http://schemas.openxmlformats.org/markup-compatibility/2006" xmlns:mv="urn:schemas-microsoft-com:mac:vml" xmlns:c="http://schemas.openxmlformats.org/drawingml/2006/chart" xmlns:dgm="http://schemas.openxmlformats.org/drawingml/2006/diagram" xmlns:o="urn:schemas-microsoft-com:office:office" xmlns:v="urn:schemas-microsoft-com:vml" xmlns:pvml="urn:schemas-microsoft-com:office:powerpoint" xmlns:com="http://schemas.openxmlformats.org/drawingml/2006/compatibility" xmlns:p14="http://schemas.microsoft.com/office/powerpoint/2010/main" xmlns:p15="http://schemas.microsoft.com/office/powerpoint/2012/main" xmlns:ahyp="http://schemas.microsoft.com/office/drawing/2018/hyperlinkcolor" xmlns:go="http://customooxmlschemas.google.com/" r:id="rId59" roundtripDataSignature="AMtx7miPyzZAukSZmCgGcZDjRTzK68qyfg=="/>
+      <go:slidesCustomData xmlns:go="http://customooxmlschemas.google.com/" xmlns:ahyp="http://schemas.microsoft.com/office/drawing/2018/hyperlinkcolor" xmlns:p15="http://schemas.microsoft.com/office/powerpoint/2012/main" xmlns:p14="http://schemas.microsoft.com/office/powerpoint/2010/main" xmlns:com="http://schemas.openxmlformats.org/drawingml/2006/compatibility" xmlns:pvml="urn:schemas-microsoft-com:office:powerpoint" xmlns:v="urn:schemas-microsoft-com:vml" xmlns:o="urn:schemas-microsoft-com:office:office" xmlns:dgm="http://schemas.openxmlformats.org/drawingml/2006/diagram" xmlns:c="http://schemas.openxmlformats.org/drawingml/2006/chart" xmlns:mv="urn:schemas-microsoft-com:mac:vml" xmlns:mc="http://schemas.openxmlformats.org/markup-compatibility/2006" xmlns="" r:id="rId59" roundtripDataSignature="AMtx7miPyzZAukSZmCgGcZDjRTzK68qyfg=="/>
     </p:ext>
   </p:extLst>
 </p:presentation>
@@ -4355,7 +4355,7 @@
           <a:p>
             <a:fld id="{F201E405-9471-4BE3-8A8B-95E639A9EAAC}" type="datetimeFigureOut">
               <a:rPr lang="en-US" smtClean="0"/>
-              <a:t>5/18/2022</a:t>
+              <a:t>12/2/2023</a:t>
             </a:fld>
             <a:endParaRPr lang="en-US"/>
           </a:p>
@@ -5473,7 +5473,7 @@
           <a:p>
             <a:fld id="{F201E405-9471-4BE3-8A8B-95E639A9EAAC}" type="datetimeFigureOut">
               <a:rPr lang="en-US" smtClean="0"/>
-              <a:t>5/18/2022</a:t>
+              <a:t>12/2/2023</a:t>
             </a:fld>
             <a:endParaRPr lang="en-US"/>
           </a:p>
@@ -5671,7 +5671,7 @@
           <a:p>
             <a:fld id="{F201E405-9471-4BE3-8A8B-95E639A9EAAC}" type="datetimeFigureOut">
               <a:rPr lang="en-US" smtClean="0"/>
-              <a:t>5/18/2022</a:t>
+              <a:t>12/2/2023</a:t>
             </a:fld>
             <a:endParaRPr lang="en-US"/>
           </a:p>
@@ -5946,7 +5946,7 @@
           <a:p>
             <a:fld id="{F201E405-9471-4BE3-8A8B-95E639A9EAAC}" type="datetimeFigureOut">
               <a:rPr lang="en-US" smtClean="0"/>
-              <a:t>5/18/2022</a:t>
+              <a:t>12/2/2023</a:t>
             </a:fld>
             <a:endParaRPr lang="en-US"/>
           </a:p>
@@ -6211,7 +6211,7 @@
           <a:p>
             <a:fld id="{F201E405-9471-4BE3-8A8B-95E639A9EAAC}" type="datetimeFigureOut">
               <a:rPr lang="en-US" smtClean="0"/>
-              <a:t>5/18/2022</a:t>
+              <a:t>12/2/2023</a:t>
             </a:fld>
             <a:endParaRPr lang="en-US"/>
           </a:p>
@@ -6623,7 +6623,7 @@
           <a:p>
             <a:fld id="{F201E405-9471-4BE3-8A8B-95E639A9EAAC}" type="datetimeFigureOut">
               <a:rPr lang="en-US" smtClean="0"/>
-              <a:t>5/18/2022</a:t>
+              <a:t>12/2/2023</a:t>
             </a:fld>
             <a:endParaRPr lang="en-US"/>
           </a:p>
@@ -7582,7 +7582,7 @@
           <a:p>
             <a:fld id="{F201E405-9471-4BE3-8A8B-95E639A9EAAC}" type="datetimeFigureOut">
               <a:rPr lang="en-US" smtClean="0"/>
-              <a:t>5/18/2022</a:t>
+              <a:t>12/2/2023</a:t>
             </a:fld>
             <a:endParaRPr lang="en-US"/>
           </a:p>
@@ -7695,7 +7695,7 @@
           <a:p>
             <a:fld id="{F201E405-9471-4BE3-8A8B-95E639A9EAAC}" type="datetimeFigureOut">
               <a:rPr lang="en-US" smtClean="0"/>
-              <a:t>5/18/2022</a:t>
+              <a:t>12/2/2023</a:t>
             </a:fld>
             <a:endParaRPr lang="en-US"/>
           </a:p>
@@ -8006,7 +8006,7 @@
           <a:p>
             <a:fld id="{F201E405-9471-4BE3-8A8B-95E639A9EAAC}" type="datetimeFigureOut">
               <a:rPr lang="en-US" smtClean="0"/>
-              <a:t>5/18/2022</a:t>
+              <a:t>12/2/2023</a:t>
             </a:fld>
             <a:endParaRPr lang="en-US"/>
           </a:p>
@@ -8294,7 +8294,7 @@
           <a:p>
             <a:fld id="{F201E405-9471-4BE3-8A8B-95E639A9EAAC}" type="datetimeFigureOut">
               <a:rPr lang="en-US" smtClean="0"/>
-              <a:t>5/18/2022</a:t>
+              <a:t>12/2/2023</a:t>
             </a:fld>
             <a:endParaRPr lang="en-US"/>
           </a:p>
@@ -8492,7 +8492,7 @@
           <a:p>
             <a:fld id="{F201E405-9471-4BE3-8A8B-95E639A9EAAC}" type="datetimeFigureOut">
               <a:rPr lang="en-US" smtClean="0"/>
-              <a:t>5/18/2022</a:t>
+              <a:t>12/2/2023</a:t>
             </a:fld>
             <a:endParaRPr lang="en-US"/>
           </a:p>
@@ -8700,7 +8700,7 @@
           <a:p>
             <a:fld id="{F201E405-9471-4BE3-8A8B-95E639A9EAAC}" type="datetimeFigureOut">
               <a:rPr lang="en-US" smtClean="0"/>
-              <a:t>5/18/2022</a:t>
+              <a:t>12/2/2023</a:t>
             </a:fld>
             <a:endParaRPr lang="en-US"/>
           </a:p>
@@ -19550,7 +19550,7 @@
           <a:p>
             <a:fld id="{F201E405-9471-4BE3-8A8B-95E639A9EAAC}" type="datetimeFigureOut">
               <a:rPr lang="en-US" smtClean="0"/>
-              <a:t>5/18/2022</a:t>
+              <a:t>12/2/2023</a:t>
             </a:fld>
             <a:endParaRPr lang="en-US"/>
           </a:p>
@@ -20269,7 +20269,7 @@
           <p:cNvPr id="2" name="Title 1">
             <a:extLst>
               <a:ext uri="{FF2B5EF4-FFF2-40B4-BE49-F238E27FC236}">
-                <a16:creationId xmlns:a16="http://schemas.microsoft.com/office/drawing/2014/main" id="{AD5E54BE-5615-4DC1-A261-A83D43A337F9}"/>
+                <a16:creationId xmlns:a16="http://schemas.microsoft.com/office/drawing/2014/main" id="{7CE66FDC-32B4-E3D8-47FE-62DD197C6280}"/>
               </a:ext>
             </a:extLst>
           </p:cNvPr>
@@ -20292,48 +20292,138 @@
           </a:p>
         </p:txBody>
       </p:sp>
-      <p:pic>
-        <p:nvPicPr>
-          <p:cNvPr id="5" name="Picture 4">
-            <a:extLst>
-              <a:ext uri="{FF2B5EF4-FFF2-40B4-BE49-F238E27FC236}">
-                <a16:creationId xmlns:a16="http://schemas.microsoft.com/office/drawing/2014/main" id="{B0EC4AA8-C079-4803-8790-7C21EECC844D}"/>
-              </a:ext>
-            </a:extLst>
-          </p:cNvPr>
-          <p:cNvPicPr>
-            <a:picLocks noChangeAspect="1"/>
-          </p:cNvPicPr>
+      <p:sp>
+        <p:nvSpPr>
+          <p:cNvPr id="4" name="Slide Number Placeholder 3">
+            <a:extLst>
+              <a:ext uri="{FF2B5EF4-FFF2-40B4-BE49-F238E27FC236}">
+                <a16:creationId xmlns:a16="http://schemas.microsoft.com/office/drawing/2014/main" id="{5A7991A2-8794-9010-0229-785C39CB7533}"/>
+              </a:ext>
+            </a:extLst>
+          </p:cNvPr>
+          <p:cNvSpPr>
+            <a:spLocks noGrp="1"/>
+          </p:cNvSpPr>
+          <p:nvPr>
+            <p:ph type="sldNum" idx="12"/>
+          </p:nvPr>
+        </p:nvSpPr>
+        <p:spPr/>
+        <p:txBody>
+          <a:bodyPr/>
+          <a:lstStyle/>
+          <a:p>
+            <a:pPr marL="0" lvl="0" indent="0" algn="ctr" rtl="0">
+              <a:spcBef>
+                <a:spcPts val="0"/>
+              </a:spcBef>
+              <a:spcAft>
+                <a:spcPts val="0"/>
+              </a:spcAft>
+              <a:buNone/>
+            </a:pPr>
+            <a:fld id="{00000000-1234-1234-1234-123412341234}" type="slidenum">
+              <a:rPr lang="en-US" smtClean="0"/>
+              <a:t>10</a:t>
+            </a:fld>
+            <a:endParaRPr lang="en-US"/>
+          </a:p>
+        </p:txBody>
+      </p:sp>
+      <p:sp>
+        <p:nvSpPr>
+          <p:cNvPr id="5" name="Oval 4">
+            <a:extLst>
+              <a:ext uri="{FF2B5EF4-FFF2-40B4-BE49-F238E27FC236}">
+                <a16:creationId xmlns:a16="http://schemas.microsoft.com/office/drawing/2014/main" id="{31C87A4D-1132-B71A-ADBF-9E03E2787DAA}"/>
+              </a:ext>
+            </a:extLst>
+          </p:cNvPr>
+          <p:cNvSpPr/>
           <p:nvPr/>
-        </p:nvPicPr>
-        <p:blipFill>
-          <a:blip r:embed="rId2">
-            <a:extLst>
-              <a:ext uri="{28A0092B-C50C-407E-A947-70E740481C1C}">
-                <a14:useLocalDpi xmlns:a14="http://schemas.microsoft.com/office/drawing/2010/main" val="0"/>
-              </a:ext>
-            </a:extLst>
-          </a:blip>
-          <a:stretch>
-            <a:fillRect/>
-          </a:stretch>
-        </p:blipFill>
+        </p:nvSpPr>
         <p:spPr>
           <a:xfrm>
-            <a:off x="1311547" y="1070399"/>
-            <a:ext cx="6520907" cy="3423476"/>
+            <a:off x="3585679" y="1702222"/>
+            <a:ext cx="1654140" cy="479461"/>
+          </a:xfrm>
+          <a:prstGeom prst="ellipse">
+            <a:avLst/>
+          </a:prstGeom>
+          <a:ln>
+            <a:noFill/>
+          </a:ln>
+        </p:spPr>
+        <p:style>
+          <a:lnRef idx="2">
+            <a:schemeClr val="accent1">
+              <a:shade val="15000"/>
+            </a:schemeClr>
+          </a:lnRef>
+          <a:fillRef idx="1">
+            <a:schemeClr val="accent1"/>
+          </a:fillRef>
+          <a:effectRef idx="0">
+            <a:schemeClr val="accent1"/>
+          </a:effectRef>
+          <a:fontRef idx="minor">
+            <a:schemeClr val="lt1"/>
+          </a:fontRef>
+        </p:style>
+        <p:txBody>
+          <a:bodyPr rtlCol="0" anchor="ctr"/>
+          <a:lstStyle/>
+          <a:p>
+            <a:pPr algn="ctr"/>
+            <a:r>
+              <a:rPr lang="en-US" dirty="0"/>
+              <a:t>Shareable</a:t>
+            </a:r>
+          </a:p>
+        </p:txBody>
+      </p:sp>
+      <p:sp>
+        <p:nvSpPr>
+          <p:cNvPr id="9" name="TextBox 8">
+            <a:extLst>
+              <a:ext uri="{FF2B5EF4-FFF2-40B4-BE49-F238E27FC236}">
+                <a16:creationId xmlns:a16="http://schemas.microsoft.com/office/drawing/2014/main" id="{8E67A4A6-72C8-AF17-2980-289BCB9F8343}"/>
+              </a:ext>
+            </a:extLst>
+          </p:cNvPr>
+          <p:cNvSpPr txBox="1"/>
+          <p:nvPr/>
+        </p:nvSpPr>
+        <p:spPr>
+          <a:xfrm>
+            <a:off x="1392446" y="3375061"/>
+            <a:ext cx="1535998" cy="246221"/>
           </a:xfrm>
           <a:prstGeom prst="rect">
             <a:avLst/>
           </a:prstGeom>
+          <a:noFill/>
         </p:spPr>
-      </p:pic>
-      <p:sp>
-        <p:nvSpPr>
-          <p:cNvPr id="7" name="TextBox 6">
-            <a:extLst>
-              <a:ext uri="{FF2B5EF4-FFF2-40B4-BE49-F238E27FC236}">
-                <a16:creationId xmlns:a16="http://schemas.microsoft.com/office/drawing/2014/main" id="{FF457394-1689-4A6D-82E3-71A861585CBE}"/>
+        <p:txBody>
+          <a:bodyPr wrap="none" rtlCol="0">
+            <a:spAutoFit/>
+          </a:bodyPr>
+          <a:lstStyle/>
+          <a:p>
+            <a:pPr algn="ctr"/>
+            <a:r>
+              <a:rPr lang="en-US" sz="1000" b="1" dirty="0"/>
+              <a:t>Design time/authoring</a:t>
+            </a:r>
+          </a:p>
+        </p:txBody>
+      </p:sp>
+      <p:sp>
+        <p:nvSpPr>
+          <p:cNvPr id="10" name="TextBox 9">
+            <a:extLst>
+              <a:ext uri="{FF2B5EF4-FFF2-40B4-BE49-F238E27FC236}">
+                <a16:creationId xmlns:a16="http://schemas.microsoft.com/office/drawing/2014/main" id="{B2600924-A9F6-E578-23C7-0DEE35440DDA}"/>
               </a:ext>
             </a:extLst>
           </p:cNvPr>
@@ -20342,7 +20432,327 @@
         </p:nvSpPr>
         <p:spPr>
           <a:xfrm>
-            <a:off x="3126368" y="4810563"/>
+            <a:off x="3623110" y="3375061"/>
+            <a:ext cx="1579278" cy="246221"/>
+          </a:xfrm>
+          <a:prstGeom prst="rect">
+            <a:avLst/>
+          </a:prstGeom>
+          <a:noFill/>
+        </p:spPr>
+        <p:txBody>
+          <a:bodyPr wrap="none" rtlCol="0">
+            <a:spAutoFit/>
+          </a:bodyPr>
+          <a:lstStyle/>
+          <a:p>
+            <a:pPr algn="ctr"/>
+            <a:r>
+              <a:rPr lang="en-US" sz="1000" b="1" dirty="0"/>
+              <a:t>Publishing/distribution</a:t>
+            </a:r>
+          </a:p>
+        </p:txBody>
+      </p:sp>
+      <p:sp>
+        <p:nvSpPr>
+          <p:cNvPr id="11" name="TextBox 10">
+            <a:extLst>
+              <a:ext uri="{FF2B5EF4-FFF2-40B4-BE49-F238E27FC236}">
+                <a16:creationId xmlns:a16="http://schemas.microsoft.com/office/drawing/2014/main" id="{E1028C5F-0A65-17D9-3DEE-5FC5CB2D8EA2}"/>
+              </a:ext>
+            </a:extLst>
+          </p:cNvPr>
+          <p:cNvSpPr txBox="1"/>
+          <p:nvPr/>
+        </p:nvSpPr>
+        <p:spPr>
+          <a:xfrm>
+            <a:off x="5825720" y="3375061"/>
+            <a:ext cx="1678665" cy="246221"/>
+          </a:xfrm>
+          <a:prstGeom prst="rect">
+            <a:avLst/>
+          </a:prstGeom>
+          <a:noFill/>
+        </p:spPr>
+        <p:txBody>
+          <a:bodyPr wrap="none" rtlCol="0">
+            <a:spAutoFit/>
+          </a:bodyPr>
+          <a:lstStyle/>
+          <a:p>
+            <a:pPr algn="ctr"/>
+            <a:r>
+              <a:rPr lang="en-US" sz="1000" b="1" dirty="0"/>
+              <a:t>Runtime/implementation</a:t>
+            </a:r>
+          </a:p>
+        </p:txBody>
+      </p:sp>
+      <p:sp>
+        <p:nvSpPr>
+          <p:cNvPr id="12" name="Oval 11">
+            <a:extLst>
+              <a:ext uri="{FF2B5EF4-FFF2-40B4-BE49-F238E27FC236}">
+                <a16:creationId xmlns:a16="http://schemas.microsoft.com/office/drawing/2014/main" id="{4367479F-8F53-D093-E9CB-2B5B94A27405}"/>
+              </a:ext>
+            </a:extLst>
+          </p:cNvPr>
+          <p:cNvSpPr/>
+          <p:nvPr/>
+        </p:nvSpPr>
+        <p:spPr>
+          <a:xfrm>
+            <a:off x="1333375" y="2635321"/>
+            <a:ext cx="1654140" cy="479461"/>
+          </a:xfrm>
+          <a:prstGeom prst="ellipse">
+            <a:avLst/>
+          </a:prstGeom>
+          <a:ln>
+            <a:noFill/>
+          </a:ln>
+        </p:spPr>
+        <p:style>
+          <a:lnRef idx="2">
+            <a:schemeClr val="accent1">
+              <a:shade val="15000"/>
+            </a:schemeClr>
+          </a:lnRef>
+          <a:fillRef idx="1">
+            <a:schemeClr val="accent1"/>
+          </a:fillRef>
+          <a:effectRef idx="0">
+            <a:schemeClr val="accent1"/>
+          </a:effectRef>
+          <a:fontRef idx="minor">
+            <a:schemeClr val="lt1"/>
+          </a:fontRef>
+        </p:style>
+        <p:txBody>
+          <a:bodyPr rtlCol="0" anchor="ctr"/>
+          <a:lstStyle/>
+          <a:p>
+            <a:pPr algn="ctr"/>
+            <a:r>
+              <a:rPr lang="en-US" dirty="0"/>
+              <a:t>Computable</a:t>
+            </a:r>
+          </a:p>
+        </p:txBody>
+      </p:sp>
+      <p:sp>
+        <p:nvSpPr>
+          <p:cNvPr id="13" name="Oval 12">
+            <a:extLst>
+              <a:ext uri="{FF2B5EF4-FFF2-40B4-BE49-F238E27FC236}">
+                <a16:creationId xmlns:a16="http://schemas.microsoft.com/office/drawing/2014/main" id="{AA5B2F76-15F6-4744-D6E0-DD79DD0D34F1}"/>
+              </a:ext>
+            </a:extLst>
+          </p:cNvPr>
+          <p:cNvSpPr/>
+          <p:nvPr/>
+        </p:nvSpPr>
+        <p:spPr>
+          <a:xfrm>
+            <a:off x="3585679" y="2635320"/>
+            <a:ext cx="1654140" cy="479461"/>
+          </a:xfrm>
+          <a:prstGeom prst="ellipse">
+            <a:avLst/>
+          </a:prstGeom>
+          <a:ln>
+            <a:noFill/>
+          </a:ln>
+        </p:spPr>
+        <p:style>
+          <a:lnRef idx="2">
+            <a:schemeClr val="accent1">
+              <a:shade val="15000"/>
+            </a:schemeClr>
+          </a:lnRef>
+          <a:fillRef idx="1">
+            <a:schemeClr val="accent1"/>
+          </a:fillRef>
+          <a:effectRef idx="0">
+            <a:schemeClr val="accent1"/>
+          </a:effectRef>
+          <a:fontRef idx="minor">
+            <a:schemeClr val="lt1"/>
+          </a:fontRef>
+        </p:style>
+        <p:txBody>
+          <a:bodyPr rtlCol="0" anchor="ctr"/>
+          <a:lstStyle/>
+          <a:p>
+            <a:pPr algn="ctr"/>
+            <a:r>
+              <a:rPr lang="en-US" dirty="0"/>
+              <a:t>Publishable</a:t>
+            </a:r>
+          </a:p>
+        </p:txBody>
+      </p:sp>
+      <p:sp>
+        <p:nvSpPr>
+          <p:cNvPr id="14" name="Oval 13">
+            <a:extLst>
+              <a:ext uri="{FF2B5EF4-FFF2-40B4-BE49-F238E27FC236}">
+                <a16:creationId xmlns:a16="http://schemas.microsoft.com/office/drawing/2014/main" id="{9592B296-7876-FF4B-2D37-13749F6FEB99}"/>
+              </a:ext>
+            </a:extLst>
+          </p:cNvPr>
+          <p:cNvSpPr/>
+          <p:nvPr/>
+        </p:nvSpPr>
+        <p:spPr>
+          <a:xfrm>
+            <a:off x="5837983" y="2638743"/>
+            <a:ext cx="1654140" cy="479461"/>
+          </a:xfrm>
+          <a:prstGeom prst="ellipse">
+            <a:avLst/>
+          </a:prstGeom>
+          <a:ln>
+            <a:noFill/>
+          </a:ln>
+        </p:spPr>
+        <p:style>
+          <a:lnRef idx="2">
+            <a:schemeClr val="accent1">
+              <a:shade val="15000"/>
+            </a:schemeClr>
+          </a:lnRef>
+          <a:fillRef idx="1">
+            <a:schemeClr val="accent1"/>
+          </a:fillRef>
+          <a:effectRef idx="0">
+            <a:schemeClr val="accent1"/>
+          </a:effectRef>
+          <a:fontRef idx="minor">
+            <a:schemeClr val="lt1"/>
+          </a:fontRef>
+        </p:style>
+        <p:txBody>
+          <a:bodyPr rtlCol="0" anchor="ctr"/>
+          <a:lstStyle/>
+          <a:p>
+            <a:pPr algn="ctr"/>
+            <a:r>
+              <a:rPr lang="en-US" dirty="0"/>
+              <a:t>Executable</a:t>
+            </a:r>
+          </a:p>
+        </p:txBody>
+      </p:sp>
+      <p:sp>
+        <p:nvSpPr>
+          <p:cNvPr id="15" name="Arrow: Right 14">
+            <a:extLst>
+              <a:ext uri="{FF2B5EF4-FFF2-40B4-BE49-F238E27FC236}">
+                <a16:creationId xmlns:a16="http://schemas.microsoft.com/office/drawing/2014/main" id="{D5893C55-D29A-DE7B-72FD-ED25F2F0BAF4}"/>
+              </a:ext>
+            </a:extLst>
+          </p:cNvPr>
+          <p:cNvSpPr/>
+          <p:nvPr/>
+        </p:nvSpPr>
+        <p:spPr>
+          <a:xfrm>
+            <a:off x="5315436" y="1854193"/>
+            <a:ext cx="1814830" cy="175517"/>
+          </a:xfrm>
+          <a:prstGeom prst="rightArrow">
+            <a:avLst/>
+          </a:prstGeom>
+        </p:spPr>
+        <p:style>
+          <a:lnRef idx="2">
+            <a:schemeClr val="accent1">
+              <a:shade val="15000"/>
+            </a:schemeClr>
+          </a:lnRef>
+          <a:fillRef idx="1">
+            <a:schemeClr val="accent1"/>
+          </a:fillRef>
+          <a:effectRef idx="0">
+            <a:schemeClr val="accent1"/>
+          </a:effectRef>
+          <a:fontRef idx="minor">
+            <a:schemeClr val="lt1"/>
+          </a:fontRef>
+        </p:style>
+        <p:txBody>
+          <a:bodyPr rtlCol="0" anchor="ctr"/>
+          <a:lstStyle/>
+          <a:p>
+            <a:pPr algn="ctr"/>
+            <a:endParaRPr lang="en-US"/>
+          </a:p>
+        </p:txBody>
+      </p:sp>
+      <p:sp>
+        <p:nvSpPr>
+          <p:cNvPr id="16" name="Arrow: Right 15">
+            <a:extLst>
+              <a:ext uri="{FF2B5EF4-FFF2-40B4-BE49-F238E27FC236}">
+                <a16:creationId xmlns:a16="http://schemas.microsoft.com/office/drawing/2014/main" id="{70EC892F-1F7E-BABD-D19C-14E18C4CF90C}"/>
+              </a:ext>
+            </a:extLst>
+          </p:cNvPr>
+          <p:cNvSpPr/>
+          <p:nvPr/>
+        </p:nvSpPr>
+        <p:spPr>
+          <a:xfrm rot="10800000">
+            <a:off x="1695232" y="1854192"/>
+            <a:ext cx="1814830" cy="175517"/>
+          </a:xfrm>
+          <a:prstGeom prst="rightArrow">
+            <a:avLst/>
+          </a:prstGeom>
+        </p:spPr>
+        <p:style>
+          <a:lnRef idx="2">
+            <a:schemeClr val="accent1">
+              <a:shade val="15000"/>
+            </a:schemeClr>
+          </a:lnRef>
+          <a:fillRef idx="1">
+            <a:schemeClr val="accent1"/>
+          </a:fillRef>
+          <a:effectRef idx="0">
+            <a:schemeClr val="accent1"/>
+          </a:effectRef>
+          <a:fontRef idx="minor">
+            <a:schemeClr val="lt1"/>
+          </a:fontRef>
+        </p:style>
+        <p:txBody>
+          <a:bodyPr rtlCol="0" anchor="ctr"/>
+          <a:lstStyle/>
+          <a:p>
+            <a:pPr algn="ctr"/>
+            <a:endParaRPr lang="en-US"/>
+          </a:p>
+        </p:txBody>
+      </p:sp>
+      <p:sp>
+        <p:nvSpPr>
+          <p:cNvPr id="17" name="TextBox 16">
+            <a:extLst>
+              <a:ext uri="{FF2B5EF4-FFF2-40B4-BE49-F238E27FC236}">
+                <a16:creationId xmlns:a16="http://schemas.microsoft.com/office/drawing/2014/main" id="{E3AEB696-54C0-844D-1745-CE79258F58C4}"/>
+              </a:ext>
+            </a:extLst>
+          </p:cNvPr>
+          <p:cNvSpPr txBox="1"/>
+          <p:nvPr/>
+        </p:nvSpPr>
+        <p:spPr>
+          <a:xfrm>
+            <a:off x="2722251" y="4839675"/>
             <a:ext cx="4570434" cy="253916"/>
           </a:xfrm>
           <a:prstGeom prst="rect">
@@ -20361,7 +20771,7 @@
                 <a:solidFill>
                   <a:schemeClr val="tx1"/>
                 </a:solidFill>
-                <a:hlinkClick r:id="rId3">
+                <a:hlinkClick r:id="rId2">
                   <a:extLst>
                     <a:ext uri="{A12FA001-AC4F-418D-AE19-62706E023703}">
                       <ahyp:hlinkClr xmlns:ahyp="http://schemas.microsoft.com/office/drawing/2018/hyperlinkcolor" val="tx"/>
@@ -20385,7 +20795,7 @@
     </p:spTree>
     <p:extLst>
       <p:ext uri="{BB962C8B-B14F-4D97-AF65-F5344CB8AC3E}">
-        <p14:creationId xmlns:p14="http://schemas.microsoft.com/office/powerpoint/2010/main" val="2247903508"/>
+        <p14:creationId xmlns:p14="http://schemas.microsoft.com/office/powerpoint/2010/main" val="2698602390"/>
       </p:ext>
     </p:extLst>
   </p:cSld>

</xml_diff>